<commit_message>
Adding the AER disaggregation routine that dispatch total cost etc. per fleetseg over vms c-square data
</commit_message>
<xml_diff>
--- a/WKTRADE2_R_workflow_initial_suggestion.pptx
+++ b/WKTRADE2_R_workflow_initial_suggestion.pptx
@@ -306,7 +306,7 @@
           <a:p>
             <a:fld id="{0804A3E0-26E0-4A89-A33E-47059F87E0AD}" type="datetimeFigureOut">
               <a:rPr lang="da-DK" smtClean="0"/>
-              <a:t>03-09-2019</a:t>
+              <a:t>16-09-2019</a:t>
             </a:fld>
             <a:endParaRPr lang="da-DK"/>
           </a:p>
@@ -644,7 +644,7 @@
           <a:p>
             <a:fld id="{0804A3E0-26E0-4A89-A33E-47059F87E0AD}" type="datetimeFigureOut">
               <a:rPr lang="da-DK" smtClean="0"/>
-              <a:t>03-09-2019</a:t>
+              <a:t>16-09-2019</a:t>
             </a:fld>
             <a:endParaRPr lang="da-DK"/>
           </a:p>
@@ -1045,7 +1045,7 @@
           <a:p>
             <a:fld id="{0804A3E0-26E0-4A89-A33E-47059F87E0AD}" type="datetimeFigureOut">
               <a:rPr lang="da-DK" smtClean="0"/>
-              <a:t>03-09-2019</a:t>
+              <a:t>16-09-2019</a:t>
             </a:fld>
             <a:endParaRPr lang="da-DK"/>
           </a:p>
@@ -1381,7 +1381,7 @@
           <a:p>
             <a:fld id="{0804A3E0-26E0-4A89-A33E-47059F87E0AD}" type="datetimeFigureOut">
               <a:rPr lang="da-DK" smtClean="0"/>
-              <a:t>03-09-2019</a:t>
+              <a:t>16-09-2019</a:t>
             </a:fld>
             <a:endParaRPr lang="da-DK"/>
           </a:p>
@@ -1701,7 +1701,7 @@
           <a:p>
             <a:fld id="{0804A3E0-26E0-4A89-A33E-47059F87E0AD}" type="datetimeFigureOut">
               <a:rPr lang="da-DK" smtClean="0"/>
-              <a:t>03-09-2019</a:t>
+              <a:t>16-09-2019</a:t>
             </a:fld>
             <a:endParaRPr lang="da-DK"/>
           </a:p>
@@ -2097,7 +2097,7 @@
           <a:p>
             <a:fld id="{0804A3E0-26E0-4A89-A33E-47059F87E0AD}" type="datetimeFigureOut">
               <a:rPr lang="da-DK" smtClean="0"/>
-              <a:t>03-09-2019</a:t>
+              <a:t>16-09-2019</a:t>
             </a:fld>
             <a:endParaRPr lang="da-DK"/>
           </a:p>
@@ -2354,7 +2354,7 @@
           <a:p>
             <a:fld id="{0804A3E0-26E0-4A89-A33E-47059F87E0AD}" type="datetimeFigureOut">
               <a:rPr lang="da-DK" smtClean="0"/>
-              <a:t>03-09-2019</a:t>
+              <a:t>16-09-2019</a:t>
             </a:fld>
             <a:endParaRPr lang="da-DK"/>
           </a:p>
@@ -2616,7 +2616,7 @@
           <a:p>
             <a:fld id="{0804A3E0-26E0-4A89-A33E-47059F87E0AD}" type="datetimeFigureOut">
               <a:rPr lang="da-DK" smtClean="0"/>
-              <a:t>03-09-2019</a:t>
+              <a:t>16-09-2019</a:t>
             </a:fld>
             <a:endParaRPr lang="da-DK"/>
           </a:p>
@@ -2878,7 +2878,7 @@
           <a:p>
             <a:fld id="{0804A3E0-26E0-4A89-A33E-47059F87E0AD}" type="datetimeFigureOut">
               <a:rPr lang="da-DK" smtClean="0"/>
-              <a:t>03-09-2019</a:t>
+              <a:t>16-09-2019</a:t>
             </a:fld>
             <a:endParaRPr lang="da-DK"/>
           </a:p>
@@ -3207,7 +3207,7 @@
           <a:p>
             <a:fld id="{0804A3E0-26E0-4A89-A33E-47059F87E0AD}" type="datetimeFigureOut">
               <a:rPr lang="da-DK" smtClean="0"/>
-              <a:t>03-09-2019</a:t>
+              <a:t>16-09-2019</a:t>
             </a:fld>
             <a:endParaRPr lang="da-DK"/>
           </a:p>
@@ -3530,7 +3530,7 @@
           <a:p>
             <a:fld id="{0804A3E0-26E0-4A89-A33E-47059F87E0AD}" type="datetimeFigureOut">
               <a:rPr lang="da-DK" smtClean="0"/>
-              <a:t>03-09-2019</a:t>
+              <a:t>16-09-2019</a:t>
             </a:fld>
             <a:endParaRPr lang="da-DK"/>
           </a:p>
@@ -3987,7 +3987,7 @@
           <a:p>
             <a:fld id="{0804A3E0-26E0-4A89-A33E-47059F87E0AD}" type="datetimeFigureOut">
               <a:rPr lang="da-DK" smtClean="0"/>
-              <a:t>03-09-2019</a:t>
+              <a:t>16-09-2019</a:t>
             </a:fld>
             <a:endParaRPr lang="da-DK"/>
           </a:p>
@@ -4192,7 +4192,7 @@
           <a:p>
             <a:fld id="{0804A3E0-26E0-4A89-A33E-47059F87E0AD}" type="datetimeFigureOut">
               <a:rPr lang="da-DK" smtClean="0"/>
-              <a:t>03-09-2019</a:t>
+              <a:t>16-09-2019</a:t>
             </a:fld>
             <a:endParaRPr lang="da-DK"/>
           </a:p>
@@ -4369,7 +4369,7 @@
           <a:p>
             <a:fld id="{0804A3E0-26E0-4A89-A33E-47059F87E0AD}" type="datetimeFigureOut">
               <a:rPr lang="da-DK" smtClean="0"/>
-              <a:t>03-09-2019</a:t>
+              <a:t>16-09-2019</a:t>
             </a:fld>
             <a:endParaRPr lang="da-DK"/>
           </a:p>
@@ -4702,7 +4702,7 @@
           <a:p>
             <a:fld id="{0804A3E0-26E0-4A89-A33E-47059F87E0AD}" type="datetimeFigureOut">
               <a:rPr lang="da-DK" smtClean="0"/>
-              <a:t>03-09-2019</a:t>
+              <a:t>16-09-2019</a:t>
             </a:fld>
             <a:endParaRPr lang="da-DK"/>
           </a:p>
@@ -5047,7 +5047,7 @@
           <a:p>
             <a:fld id="{0804A3E0-26E0-4A89-A33E-47059F87E0AD}" type="datetimeFigureOut">
               <a:rPr lang="da-DK" smtClean="0"/>
-              <a:t>03-09-2019</a:t>
+              <a:t>16-09-2019</a:t>
             </a:fld>
             <a:endParaRPr lang="da-DK"/>
           </a:p>
@@ -7186,7 +7186,7 @@
           <a:p>
             <a:fld id="{0804A3E0-26E0-4A89-A33E-47059F87E0AD}" type="datetimeFigureOut">
               <a:rPr lang="da-DK" smtClean="0"/>
-              <a:t>03-09-2019</a:t>
+              <a:t>16-09-2019</a:t>
             </a:fld>
             <a:endParaRPr lang="da-DK"/>
           </a:p>
@@ -8273,11 +8273,7 @@
               </a:r>
               <a:r>
                 <a:rPr lang="da-DK" sz="1200" b="1" dirty="0"/>
-                <a:t>LONG TERM DYNAMICS </a:t>
-              </a:r>
-              <a:r>
-                <a:rPr lang="da-DK" sz="1200" b="1" dirty="0"/>
-                <a:t>MODELLING (RBS, </a:t>
+                <a:t>LONG TERM DYNAMICS MODELLING (RBS, </a:t>
               </a:r>
               <a:r>
                 <a:rPr lang="da-DK" sz="1200" b="1" dirty="0" err="1"/>
@@ -8423,7 +8419,7 @@
         </p:nvSpPr>
         <p:spPr>
           <a:xfrm>
-            <a:off x="380022" y="245718"/>
+            <a:off x="409050" y="548218"/>
             <a:ext cx="6232796" cy="369332"/>
           </a:xfrm>
           <a:prstGeom prst="rect">
@@ -9175,11 +9171,7 @@
               </a:r>
               <a:r>
                 <a:rPr lang="da-DK" sz="1200" b="1" dirty="0"/>
-                <a:t>LONG TERM DYNAMICS </a:t>
-              </a:r>
-              <a:r>
-                <a:rPr lang="da-DK" sz="1200" b="1" dirty="0"/>
-                <a:t>MODELLING (RBS, </a:t>
+                <a:t>LONG TERM DYNAMICS MODELLING (RBS, </a:t>
               </a:r>
               <a:r>
                 <a:rPr lang="da-DK" sz="1200" b="1" dirty="0" err="1"/>
@@ -10100,7 +10092,7 @@
         </p:nvSpPr>
         <p:spPr>
           <a:xfrm>
-            <a:off x="380022" y="245718"/>
+            <a:off x="364524" y="455721"/>
             <a:ext cx="6232796" cy="369332"/>
           </a:xfrm>
           <a:prstGeom prst="rect">
@@ -11589,6 +11581,234 @@
           </a:fontRef>
         </p:style>
       </p:cxnSp>
+      <p:sp>
+        <p:nvSpPr>
+          <p:cNvPr id="4" name="TextBox 3"/>
+          <p:cNvSpPr txBox="1"/>
+          <p:nvPr/>
+        </p:nvSpPr>
+        <p:spPr>
+          <a:xfrm>
+            <a:off x="4696183" y="3103204"/>
+            <a:ext cx="532518" cy="246221"/>
+          </a:xfrm>
+          <a:prstGeom prst="rect">
+            <a:avLst/>
+          </a:prstGeom>
+          <a:noFill/>
+        </p:spPr>
+        <p:txBody>
+          <a:bodyPr wrap="none" rtlCol="0">
+            <a:spAutoFit/>
+          </a:bodyPr>
+          <a:lstStyle/>
+          <a:p>
+            <a:r>
+              <a:rPr lang="da-DK" sz="1000" b="1" dirty="0" smtClean="0">
+                <a:solidFill>
+                  <a:schemeClr val="bg1"/>
+                </a:solidFill>
+              </a:rPr>
+              <a:t>W_1 *</a:t>
+            </a:r>
+            <a:endParaRPr lang="da-DK" sz="1000" b="1" dirty="0">
+              <a:solidFill>
+                <a:schemeClr val="bg1"/>
+              </a:solidFill>
+            </a:endParaRPr>
+          </a:p>
+        </p:txBody>
+      </p:sp>
+      <p:sp>
+        <p:nvSpPr>
+          <p:cNvPr id="54" name="TextBox 53"/>
+          <p:cNvSpPr txBox="1"/>
+          <p:nvPr/>
+        </p:nvSpPr>
+        <p:spPr>
+          <a:xfrm>
+            <a:off x="4693318" y="3688935"/>
+            <a:ext cx="532518" cy="246221"/>
+          </a:xfrm>
+          <a:prstGeom prst="rect">
+            <a:avLst/>
+          </a:prstGeom>
+          <a:noFill/>
+        </p:spPr>
+        <p:txBody>
+          <a:bodyPr wrap="none" rtlCol="0">
+            <a:spAutoFit/>
+          </a:bodyPr>
+          <a:lstStyle/>
+          <a:p>
+            <a:r>
+              <a:rPr lang="da-DK" sz="1000" b="1" dirty="0" smtClean="0">
+                <a:solidFill>
+                  <a:schemeClr val="bg1"/>
+                </a:solidFill>
+              </a:rPr>
+              <a:t>W_2 *</a:t>
+            </a:r>
+            <a:endParaRPr lang="da-DK" sz="1000" b="1" dirty="0">
+              <a:solidFill>
+                <a:schemeClr val="bg1"/>
+              </a:solidFill>
+            </a:endParaRPr>
+          </a:p>
+        </p:txBody>
+      </p:sp>
+      <p:sp>
+        <p:nvSpPr>
+          <p:cNvPr id="55" name="TextBox 54"/>
+          <p:cNvSpPr txBox="1"/>
+          <p:nvPr/>
+        </p:nvSpPr>
+        <p:spPr>
+          <a:xfrm>
+            <a:off x="4646427" y="5018843"/>
+            <a:ext cx="532518" cy="246221"/>
+          </a:xfrm>
+          <a:prstGeom prst="rect">
+            <a:avLst/>
+          </a:prstGeom>
+          <a:noFill/>
+        </p:spPr>
+        <p:txBody>
+          <a:bodyPr wrap="none" rtlCol="0">
+            <a:spAutoFit/>
+          </a:bodyPr>
+          <a:lstStyle/>
+          <a:p>
+            <a:r>
+              <a:rPr lang="da-DK" sz="1000" b="1" dirty="0" smtClean="0">
+                <a:solidFill>
+                  <a:schemeClr val="bg1"/>
+                </a:solidFill>
+              </a:rPr>
+              <a:t>W_4 *</a:t>
+            </a:r>
+            <a:endParaRPr lang="da-DK" sz="1000" b="1" dirty="0">
+              <a:solidFill>
+                <a:schemeClr val="bg1"/>
+              </a:solidFill>
+            </a:endParaRPr>
+          </a:p>
+        </p:txBody>
+      </p:sp>
+      <p:sp>
+        <p:nvSpPr>
+          <p:cNvPr id="56" name="TextBox 55"/>
+          <p:cNvSpPr txBox="1"/>
+          <p:nvPr/>
+        </p:nvSpPr>
+        <p:spPr>
+          <a:xfrm>
+            <a:off x="4669350" y="4376117"/>
+            <a:ext cx="532518" cy="246221"/>
+          </a:xfrm>
+          <a:prstGeom prst="rect">
+            <a:avLst/>
+          </a:prstGeom>
+          <a:noFill/>
+        </p:spPr>
+        <p:txBody>
+          <a:bodyPr wrap="none" rtlCol="0">
+            <a:spAutoFit/>
+          </a:bodyPr>
+          <a:lstStyle/>
+          <a:p>
+            <a:r>
+              <a:rPr lang="da-DK" sz="1000" b="1" dirty="0" smtClean="0">
+                <a:solidFill>
+                  <a:schemeClr val="bg1"/>
+                </a:solidFill>
+              </a:rPr>
+              <a:t>W_3 *</a:t>
+            </a:r>
+            <a:endParaRPr lang="da-DK" sz="1000" b="1" dirty="0">
+              <a:solidFill>
+                <a:schemeClr val="bg1"/>
+              </a:solidFill>
+            </a:endParaRPr>
+          </a:p>
+        </p:txBody>
+      </p:sp>
+      <p:sp>
+        <p:nvSpPr>
+          <p:cNvPr id="57" name="TextBox 56"/>
+          <p:cNvSpPr txBox="1"/>
+          <p:nvPr/>
+        </p:nvSpPr>
+        <p:spPr>
+          <a:xfrm>
+            <a:off x="4679353" y="5723772"/>
+            <a:ext cx="532518" cy="246221"/>
+          </a:xfrm>
+          <a:prstGeom prst="rect">
+            <a:avLst/>
+          </a:prstGeom>
+          <a:noFill/>
+        </p:spPr>
+        <p:txBody>
+          <a:bodyPr wrap="none" rtlCol="0">
+            <a:spAutoFit/>
+          </a:bodyPr>
+          <a:lstStyle/>
+          <a:p>
+            <a:r>
+              <a:rPr lang="da-DK" sz="1000" b="1" dirty="0" smtClean="0">
+                <a:solidFill>
+                  <a:schemeClr val="bg1"/>
+                </a:solidFill>
+              </a:rPr>
+              <a:t>W_5 *</a:t>
+            </a:r>
+            <a:endParaRPr lang="da-DK" sz="1000" b="1" dirty="0">
+              <a:solidFill>
+                <a:schemeClr val="bg1"/>
+              </a:solidFill>
+            </a:endParaRPr>
+          </a:p>
+        </p:txBody>
+      </p:sp>
+      <p:sp>
+        <p:nvSpPr>
+          <p:cNvPr id="58" name="TextBox 57"/>
+          <p:cNvSpPr txBox="1"/>
+          <p:nvPr/>
+        </p:nvSpPr>
+        <p:spPr>
+          <a:xfrm>
+            <a:off x="4633021" y="6346638"/>
+            <a:ext cx="532518" cy="246221"/>
+          </a:xfrm>
+          <a:prstGeom prst="rect">
+            <a:avLst/>
+          </a:prstGeom>
+          <a:noFill/>
+        </p:spPr>
+        <p:txBody>
+          <a:bodyPr wrap="none" rtlCol="0">
+            <a:spAutoFit/>
+          </a:bodyPr>
+          <a:lstStyle/>
+          <a:p>
+            <a:r>
+              <a:rPr lang="da-DK" sz="1000" b="1" dirty="0" smtClean="0">
+                <a:solidFill>
+                  <a:schemeClr val="bg1"/>
+                </a:solidFill>
+              </a:rPr>
+              <a:t>W_6 *</a:t>
+            </a:r>
+            <a:endParaRPr lang="da-DK" sz="1000" b="1" dirty="0">
+              <a:solidFill>
+                <a:schemeClr val="bg1"/>
+              </a:solidFill>
+            </a:endParaRPr>
+          </a:p>
+        </p:txBody>
+      </p:sp>
     </p:spTree>
     <p:extLst>
       <p:ext uri="{BB962C8B-B14F-4D97-AF65-F5344CB8AC3E}">

</xml_diff>